<commit_message>
Quản lý sản phẩm, kích thước sản phẩm
</commit_message>
<xml_diff>
--- a/thesis/abs/BIEU_DO_USER_CASE.pptx
+++ b/thesis/abs/BIEU_DO_USER_CASE.pptx
@@ -109,6 +109,11 @@
       </a:defRPr>
     </a:lvl9pPr>
   </p:defaultTextStyle>
+  <p:extLst>
+    <p:ext uri="{EFAFB233-063F-42B5-8137-9DF3F51BA10A}">
+      <p15:sldGuideLst xmlns:p15="http://schemas.microsoft.com/office/powerpoint/2012/main"/>
+    </p:ext>
+  </p:extLst>
 </p:presentation>
 </file>
 
@@ -259,7 +264,7 @@
           <a:p>
             <a:fld id="{BF612C08-068C-433F-B30A-F0A9FFDF2272}" type="datetimeFigureOut">
               <a:rPr lang="en-US" smtClean="0"/>
-              <a:t>12/2/2024</a:t>
+              <a:t>12/23/2024</a:t>
             </a:fld>
             <a:endParaRPr lang="en-US"/>
           </a:p>
@@ -457,7 +462,7 @@
           <a:p>
             <a:fld id="{BF612C08-068C-433F-B30A-F0A9FFDF2272}" type="datetimeFigureOut">
               <a:rPr lang="en-US" smtClean="0"/>
-              <a:t>12/2/2024</a:t>
+              <a:t>12/23/2024</a:t>
             </a:fld>
             <a:endParaRPr lang="en-US"/>
           </a:p>
@@ -665,7 +670,7 @@
           <a:p>
             <a:fld id="{BF612C08-068C-433F-B30A-F0A9FFDF2272}" type="datetimeFigureOut">
               <a:rPr lang="en-US" smtClean="0"/>
-              <a:t>12/2/2024</a:t>
+              <a:t>12/23/2024</a:t>
             </a:fld>
             <a:endParaRPr lang="en-US"/>
           </a:p>
@@ -863,7 +868,7 @@
           <a:p>
             <a:fld id="{BF612C08-068C-433F-B30A-F0A9FFDF2272}" type="datetimeFigureOut">
               <a:rPr lang="en-US" smtClean="0"/>
-              <a:t>12/2/2024</a:t>
+              <a:t>12/23/2024</a:t>
             </a:fld>
             <a:endParaRPr lang="en-US"/>
           </a:p>
@@ -1138,7 +1143,7 @@
           <a:p>
             <a:fld id="{BF612C08-068C-433F-B30A-F0A9FFDF2272}" type="datetimeFigureOut">
               <a:rPr lang="en-US" smtClean="0"/>
-              <a:t>12/2/2024</a:t>
+              <a:t>12/23/2024</a:t>
             </a:fld>
             <a:endParaRPr lang="en-US"/>
           </a:p>
@@ -1403,7 +1408,7 @@
           <a:p>
             <a:fld id="{BF612C08-068C-433F-B30A-F0A9FFDF2272}" type="datetimeFigureOut">
               <a:rPr lang="en-US" smtClean="0"/>
-              <a:t>12/2/2024</a:t>
+              <a:t>12/23/2024</a:t>
             </a:fld>
             <a:endParaRPr lang="en-US"/>
           </a:p>
@@ -1815,7 +1820,7 @@
           <a:p>
             <a:fld id="{BF612C08-068C-433F-B30A-F0A9FFDF2272}" type="datetimeFigureOut">
               <a:rPr lang="en-US" smtClean="0"/>
-              <a:t>12/2/2024</a:t>
+              <a:t>12/23/2024</a:t>
             </a:fld>
             <a:endParaRPr lang="en-US"/>
           </a:p>
@@ -1956,7 +1961,7 @@
           <a:p>
             <a:fld id="{BF612C08-068C-433F-B30A-F0A9FFDF2272}" type="datetimeFigureOut">
               <a:rPr lang="en-US" smtClean="0"/>
-              <a:t>12/2/2024</a:t>
+              <a:t>12/23/2024</a:t>
             </a:fld>
             <a:endParaRPr lang="en-US"/>
           </a:p>
@@ -2069,7 +2074,7 @@
           <a:p>
             <a:fld id="{BF612C08-068C-433F-B30A-F0A9FFDF2272}" type="datetimeFigureOut">
               <a:rPr lang="en-US" smtClean="0"/>
-              <a:t>12/2/2024</a:t>
+              <a:t>12/23/2024</a:t>
             </a:fld>
             <a:endParaRPr lang="en-US"/>
           </a:p>
@@ -2380,7 +2385,7 @@
           <a:p>
             <a:fld id="{BF612C08-068C-433F-B30A-F0A9FFDF2272}" type="datetimeFigureOut">
               <a:rPr lang="en-US" smtClean="0"/>
-              <a:t>12/2/2024</a:t>
+              <a:t>12/23/2024</a:t>
             </a:fld>
             <a:endParaRPr lang="en-US"/>
           </a:p>
@@ -2668,7 +2673,7 @@
           <a:p>
             <a:fld id="{BF612C08-068C-433F-B30A-F0A9FFDF2272}" type="datetimeFigureOut">
               <a:rPr lang="en-US" smtClean="0"/>
-              <a:t>12/2/2024</a:t>
+              <a:t>12/23/2024</a:t>
             </a:fld>
             <a:endParaRPr lang="en-US"/>
           </a:p>
@@ -2909,7 +2914,7 @@
           <a:p>
             <a:fld id="{BF612C08-068C-433F-B30A-F0A9FFDF2272}" type="datetimeFigureOut">
               <a:rPr lang="en-US" smtClean="0"/>
-              <a:t>12/2/2024</a:t>
+              <a:t>12/23/2024</a:t>
             </a:fld>
             <a:endParaRPr lang="en-US"/>
           </a:p>
@@ -5189,7 +5194,7 @@
         <p:spPr>
           <a:xfrm>
             <a:off x="2204534" y="2015341"/>
-            <a:ext cx="1291892" cy="369332"/>
+            <a:ext cx="1330814" cy="369332"/>
           </a:xfrm>
           <a:prstGeom prst="rect">
             <a:avLst/>
@@ -5204,7 +5209,7 @@
           <a:p>
             <a:r>
               <a:rPr lang="en-US"/>
-              <a:t>&lt;&lt;extend&gt;&gt;</a:t>
+              <a:t>&lt;&lt;include&gt;&gt;</a:t>
             </a:r>
           </a:p>
         </p:txBody>
@@ -5224,7 +5229,7 @@
         <p:spPr>
           <a:xfrm>
             <a:off x="6203526" y="744030"/>
-            <a:ext cx="1291892" cy="369332"/>
+            <a:ext cx="1481068" cy="369332"/>
           </a:xfrm>
           <a:prstGeom prst="rect">
             <a:avLst/>
@@ -5239,7 +5244,7 @@
           <a:p>
             <a:r>
               <a:rPr lang="en-US"/>
-              <a:t>&lt;&lt;extend&gt;&gt;</a:t>
+              <a:t>&lt;&lt;include&gt;&gt;</a:t>
             </a:r>
           </a:p>
         </p:txBody>
@@ -5274,7 +5279,7 @@
           <a:p>
             <a:r>
               <a:rPr lang="en-US"/>
-              <a:t>&lt;&lt;extend&gt;&gt;</a:t>
+              <a:t>&lt;&lt;include&gt;&gt;</a:t>
             </a:r>
           </a:p>
         </p:txBody>
@@ -5368,7 +5373,7 @@
         <p:spPr>
           <a:xfrm>
             <a:off x="4482233" y="5761920"/>
-            <a:ext cx="2829621" cy="369332"/>
+            <a:ext cx="2938625" cy="369332"/>
           </a:xfrm>
           <a:prstGeom prst="rect">
             <a:avLst/>
@@ -5383,7 +5388,7 @@
           <a:p>
             <a:r>
               <a:rPr lang="en-US"/>
-              <a:t>Quản lý thôn tin khách hàng</a:t>
+              <a:t>Quản lý thông tin khách hàng</a:t>
             </a:r>
           </a:p>
         </p:txBody>
@@ -5935,7 +5940,7 @@
           <a:p>
             <a:r>
               <a:rPr lang="en-US"/>
-              <a:t>&lt;&lt;extend&gt;&gt;</a:t>
+              <a:t>&lt;&lt;include&gt;&gt;</a:t>
             </a:r>
           </a:p>
         </p:txBody>
@@ -6504,7 +6509,7 @@
           <a:p>
             <a:r>
               <a:rPr lang="en-US"/>
-              <a:t>&lt;&lt;extend&gt;&gt;</a:t>
+              <a:t>&lt;&lt;include&gt;&gt;</a:t>
             </a:r>
           </a:p>
         </p:txBody>
@@ -6539,7 +6544,7 @@
           <a:p>
             <a:r>
               <a:rPr lang="en-US"/>
-              <a:t>&lt;&lt;extend&gt;&gt;</a:t>
+              <a:t>&lt;&lt;include&gt;&gt;</a:t>
             </a:r>
           </a:p>
         </p:txBody>
@@ -6574,7 +6579,7 @@
           <a:p>
             <a:r>
               <a:rPr lang="en-US"/>
-              <a:t>&lt;&lt;extend&gt;&gt;</a:t>
+              <a:t>&lt;&lt;include&gt;&gt;</a:t>
             </a:r>
           </a:p>
         </p:txBody>
@@ -6609,7 +6614,7 @@
           <a:p>
             <a:r>
               <a:rPr lang="en-US"/>
-              <a:t>&lt;&lt;extend&gt;&gt;</a:t>
+              <a:t>&lt;&lt;include&gt;&gt;</a:t>
             </a:r>
           </a:p>
         </p:txBody>
@@ -6644,7 +6649,7 @@
           <a:p>
             <a:r>
               <a:rPr lang="en-US"/>
-              <a:t>&lt;&lt;extend&gt;&gt;</a:t>
+              <a:t>&lt;&lt;include&gt;&gt;</a:t>
             </a:r>
           </a:p>
         </p:txBody>
@@ -7383,7 +7388,7 @@
           <a:p>
             <a:r>
               <a:rPr lang="en-US"/>
-              <a:t>&lt;&lt;extend&gt;&gt;</a:t>
+              <a:t>&lt;&lt;include&gt;&gt;</a:t>
             </a:r>
           </a:p>
         </p:txBody>
@@ -7462,7 +7467,7 @@
           <a:p>
             <a:r>
               <a:rPr lang="en-US"/>
-              <a:t>&lt;&lt;extend&gt;&gt;</a:t>
+              <a:t>&lt;&lt;include&gt;&gt;</a:t>
             </a:r>
           </a:p>
         </p:txBody>
@@ -7541,7 +7546,7 @@
           <a:p>
             <a:r>
               <a:rPr lang="en-US"/>
-              <a:t>&lt;&lt;extend&gt;&gt;</a:t>
+              <a:t>&lt;&lt;include&gt;&gt;</a:t>
             </a:r>
           </a:p>
         </p:txBody>
@@ -7764,7 +7769,7 @@
           <a:p>
             <a:r>
               <a:rPr lang="en-US"/>
-              <a:t>&lt;&lt;extend&gt;&gt;</a:t>
+              <a:t>&lt;&lt;include&gt;&gt;</a:t>
             </a:r>
           </a:p>
         </p:txBody>
@@ -8504,7 +8509,7 @@
           <a:p>
             <a:r>
               <a:rPr lang="en-US"/>
-              <a:t>&lt;&lt;extend&gt;&gt;</a:t>
+              <a:t>&lt;&lt;include&gt;&gt;</a:t>
             </a:r>
           </a:p>
         </p:txBody>
@@ -8951,7 +8956,7 @@
           <a:p>
             <a:r>
               <a:rPr lang="en-US"/>
-              <a:t>&lt;&lt;extend&gt;&gt;</a:t>
+              <a:t>&lt;&lt;include&gt;&gt;</a:t>
             </a:r>
           </a:p>
         </p:txBody>

</xml_diff>

<commit_message>
Quản lý dơn hàng
</commit_message>
<xml_diff>
--- a/thesis/abs/BIEU_DO_USER_CASE.pptx
+++ b/thesis/abs/BIEU_DO_USER_CASE.pptx
@@ -264,7 +264,7 @@
           <a:p>
             <a:fld id="{BF612C08-068C-433F-B30A-F0A9FFDF2272}" type="datetimeFigureOut">
               <a:rPr lang="en-US" smtClean="0"/>
-              <a:t>12/23/2024</a:t>
+              <a:t>12/28/2024</a:t>
             </a:fld>
             <a:endParaRPr lang="en-US"/>
           </a:p>
@@ -462,7 +462,7 @@
           <a:p>
             <a:fld id="{BF612C08-068C-433F-B30A-F0A9FFDF2272}" type="datetimeFigureOut">
               <a:rPr lang="en-US" smtClean="0"/>
-              <a:t>12/23/2024</a:t>
+              <a:t>12/28/2024</a:t>
             </a:fld>
             <a:endParaRPr lang="en-US"/>
           </a:p>
@@ -670,7 +670,7 @@
           <a:p>
             <a:fld id="{BF612C08-068C-433F-B30A-F0A9FFDF2272}" type="datetimeFigureOut">
               <a:rPr lang="en-US" smtClean="0"/>
-              <a:t>12/23/2024</a:t>
+              <a:t>12/28/2024</a:t>
             </a:fld>
             <a:endParaRPr lang="en-US"/>
           </a:p>
@@ -868,7 +868,7 @@
           <a:p>
             <a:fld id="{BF612C08-068C-433F-B30A-F0A9FFDF2272}" type="datetimeFigureOut">
               <a:rPr lang="en-US" smtClean="0"/>
-              <a:t>12/23/2024</a:t>
+              <a:t>12/28/2024</a:t>
             </a:fld>
             <a:endParaRPr lang="en-US"/>
           </a:p>
@@ -1143,7 +1143,7 @@
           <a:p>
             <a:fld id="{BF612C08-068C-433F-B30A-F0A9FFDF2272}" type="datetimeFigureOut">
               <a:rPr lang="en-US" smtClean="0"/>
-              <a:t>12/23/2024</a:t>
+              <a:t>12/28/2024</a:t>
             </a:fld>
             <a:endParaRPr lang="en-US"/>
           </a:p>
@@ -1408,7 +1408,7 @@
           <a:p>
             <a:fld id="{BF612C08-068C-433F-B30A-F0A9FFDF2272}" type="datetimeFigureOut">
               <a:rPr lang="en-US" smtClean="0"/>
-              <a:t>12/23/2024</a:t>
+              <a:t>12/28/2024</a:t>
             </a:fld>
             <a:endParaRPr lang="en-US"/>
           </a:p>
@@ -1820,7 +1820,7 @@
           <a:p>
             <a:fld id="{BF612C08-068C-433F-B30A-F0A9FFDF2272}" type="datetimeFigureOut">
               <a:rPr lang="en-US" smtClean="0"/>
-              <a:t>12/23/2024</a:t>
+              <a:t>12/28/2024</a:t>
             </a:fld>
             <a:endParaRPr lang="en-US"/>
           </a:p>
@@ -1961,7 +1961,7 @@
           <a:p>
             <a:fld id="{BF612C08-068C-433F-B30A-F0A9FFDF2272}" type="datetimeFigureOut">
               <a:rPr lang="en-US" smtClean="0"/>
-              <a:t>12/23/2024</a:t>
+              <a:t>12/28/2024</a:t>
             </a:fld>
             <a:endParaRPr lang="en-US"/>
           </a:p>
@@ -2074,7 +2074,7 @@
           <a:p>
             <a:fld id="{BF612C08-068C-433F-B30A-F0A9FFDF2272}" type="datetimeFigureOut">
               <a:rPr lang="en-US" smtClean="0"/>
-              <a:t>12/23/2024</a:t>
+              <a:t>12/28/2024</a:t>
             </a:fld>
             <a:endParaRPr lang="en-US"/>
           </a:p>
@@ -2385,7 +2385,7 @@
           <a:p>
             <a:fld id="{BF612C08-068C-433F-B30A-F0A9FFDF2272}" type="datetimeFigureOut">
               <a:rPr lang="en-US" smtClean="0"/>
-              <a:t>12/23/2024</a:t>
+              <a:t>12/28/2024</a:t>
             </a:fld>
             <a:endParaRPr lang="en-US"/>
           </a:p>
@@ -2673,7 +2673,7 @@
           <a:p>
             <a:fld id="{BF612C08-068C-433F-B30A-F0A9FFDF2272}" type="datetimeFigureOut">
               <a:rPr lang="en-US" smtClean="0"/>
-              <a:t>12/23/2024</a:t>
+              <a:t>12/28/2024</a:t>
             </a:fld>
             <a:endParaRPr lang="en-US"/>
           </a:p>
@@ -2914,7 +2914,7 @@
           <a:p>
             <a:fld id="{BF612C08-068C-433F-B30A-F0A9FFDF2272}" type="datetimeFigureOut">
               <a:rPr lang="en-US" smtClean="0"/>
-              <a:t>12/23/2024</a:t>
+              <a:t>12/28/2024</a:t>
             </a:fld>
             <a:endParaRPr lang="en-US"/>
           </a:p>
@@ -6509,7 +6509,7 @@
           <a:p>
             <a:r>
               <a:rPr lang="en-US"/>
-              <a:t>&lt;&lt;include&gt;&gt;</a:t>
+              <a:t>&lt;&lt;extend&gt;&gt;</a:t>
             </a:r>
           </a:p>
         </p:txBody>
@@ -7769,7 +7769,7 @@
           <a:p>
             <a:r>
               <a:rPr lang="en-US"/>
-              <a:t>&lt;&lt;include&gt;&gt;</a:t>
+              <a:t>&lt;&lt;extend&gt;&gt;</a:t>
             </a:r>
           </a:p>
         </p:txBody>
@@ -8509,7 +8509,7 @@
           <a:p>
             <a:r>
               <a:rPr lang="en-US"/>
-              <a:t>&lt;&lt;include&gt;&gt;</a:t>
+              <a:t>&lt;&lt;extand&gt;&gt;</a:t>
             </a:r>
           </a:p>
         </p:txBody>
@@ -8956,7 +8956,7 @@
           <a:p>
             <a:r>
               <a:rPr lang="en-US"/>
-              <a:t>&lt;&lt;include&gt;&gt;</a:t>
+              <a:t>&lt;&lt;extand&gt;&gt;</a:t>
             </a:r>
           </a:p>
         </p:txBody>

</xml_diff>